<commit_message>
Error in the slides fixed.
</commit_message>
<xml_diff>
--- a/final.pptx
+++ b/final.pptx
@@ -4,17 +4,18 @@
   <p:sldMasterIdLst>
     <p:sldMasterId id="2147483648" r:id="rId2"/>
     <p:sldMasterId id="2147483650" r:id="rId3"/>
+    <p:sldMasterId id="2147483652" r:id="rId4"/>
   </p:sldMasterIdLst>
   <p:sldIdLst>
-    <p:sldId id="256" r:id="rId4"/>
-    <p:sldId id="257" r:id="rId5"/>
-    <p:sldId id="258" r:id="rId6"/>
-    <p:sldId id="259" r:id="rId7"/>
-    <p:sldId id="260" r:id="rId8"/>
-    <p:sldId id="261" r:id="rId9"/>
-    <p:sldId id="262" r:id="rId10"/>
-    <p:sldId id="263" r:id="rId11"/>
-    <p:sldId id="264" r:id="rId12"/>
+    <p:sldId id="256" r:id="rId5"/>
+    <p:sldId id="257" r:id="rId6"/>
+    <p:sldId id="258" r:id="rId7"/>
+    <p:sldId id="259" r:id="rId8"/>
+    <p:sldId id="260" r:id="rId9"/>
+    <p:sldId id="261" r:id="rId10"/>
+    <p:sldId id="262" r:id="rId11"/>
+    <p:sldId id="263" r:id="rId12"/>
+    <p:sldId id="264" r:id="rId13"/>
   </p:sldIdLst>
   <p:sldSz cx="10080625" cy="5670550"/>
   <p:notesSz cx="7559675" cy="10691813"/>
@@ -51,7 +52,7 @@
         <p:spPr>
           <a:xfrm>
             <a:off x="504000" y="226080"/>
-            <a:ext cx="9071280" cy="946080"/>
+            <a:ext cx="9072000" cy="946440"/>
           </a:xfrm>
           <a:prstGeom prst="rect">
             <a:avLst/>
@@ -155,7 +156,7 @@
         <p:txBody>
           <a:bodyPr/>
           <a:p>
-            <a:fld id="{68C00B36-81FC-4495-BF2B-E555AEE61B05}" type="slidenum">
+            <a:fld id="{32603C87-36F8-47CC-96F7-425CBDC49715}" type="slidenum">
               <a:t>&lt;#&gt;</a:t>
             </a:fld>
           </a:p>
@@ -188,7 +189,7 @@
 </file>
 
 <file path=ppt/slideLayouts/slideLayout2.xml><?xml version="1.0" encoding="utf-8"?>
-<p:sldLayout xmlns:a="http://schemas.openxmlformats.org/drawingml/2006/main" xmlns:p="http://schemas.openxmlformats.org/presentationml/2006/main" xmlns:r="http://schemas.openxmlformats.org/officeDocument/2006/relationships" xmlns:p14="http://schemas.microsoft.com/office/powerpoint/2010/main" xmlns:p15="http://schemas.microsoft.com/office/powerpoint/2012/main" xmlns:mc="http://schemas.openxmlformats.org/markup-compatibility/2006" type="mediaAndTx" preserve="1">
+<p:sldLayout xmlns:a="http://schemas.openxmlformats.org/drawingml/2006/main" xmlns:p="http://schemas.openxmlformats.org/presentationml/2006/main" xmlns:r="http://schemas.openxmlformats.org/officeDocument/2006/relationships" xmlns:p14="http://schemas.microsoft.com/office/powerpoint/2010/main" xmlns:p15="http://schemas.microsoft.com/office/powerpoint/2012/main" xmlns:mc="http://schemas.openxmlformats.org/markup-compatibility/2006" type="blank" preserve="1">
   <p:cSld name="Default 1">
     <p:spTree>
       <p:nvGrpSpPr>
@@ -238,7 +239,7 @@
         <p:txBody>
           <a:bodyPr/>
           <a:p>
-            <a:fld id="{37BB8040-7F68-4982-841E-0081A5BA0B1E}" type="slidenum">
+            <a:fld id="{88FC44CD-10BF-47F5-8D1A-CE0D6F882C13}" type="slidenum">
               <a:t>&lt;#&gt;</a:t>
             </a:fld>
           </a:p>
@@ -272,7 +273,7 @@
 
 <file path=ppt/slideLayouts/slideLayout3.xml><?xml version="1.0" encoding="utf-8"?>
 <p:sldLayout xmlns:a="http://schemas.openxmlformats.org/drawingml/2006/main" xmlns:p="http://schemas.openxmlformats.org/presentationml/2006/main" xmlns:r="http://schemas.openxmlformats.org/officeDocument/2006/relationships" xmlns:p14="http://schemas.microsoft.com/office/powerpoint/2010/main" xmlns:p15="http://schemas.microsoft.com/office/powerpoint/2012/main" xmlns:mc="http://schemas.openxmlformats.org/markup-compatibility/2006" type="title" preserve="1">
-  <p:cSld name="Default 1">
+  <p:cSld name="Default 2">
     <p:spTree>
       <p:nvGrpSpPr>
         <p:cNvPr id="1" name=""/>
@@ -289,7 +290,7 @@
       </p:grpSpPr>
       <p:sp>
         <p:nvSpPr>
-          <p:cNvPr id="12" name="PlaceHolder 1"/>
+          <p:cNvPr id="17" name="PlaceHolder 1"/>
           <p:cNvSpPr>
             <a:spLocks noGrp="1"/>
           </p:cNvSpPr>
@@ -300,7 +301,7 @@
         <p:spPr>
           <a:xfrm>
             <a:off x="504000" y="226080"/>
-            <a:ext cx="9071280" cy="946080"/>
+            <a:ext cx="9072000" cy="946440"/>
           </a:xfrm>
           <a:prstGeom prst="rect">
             <a:avLst/>
@@ -329,7 +330,7 @@
       </p:sp>
       <p:sp>
         <p:nvSpPr>
-          <p:cNvPr id="13" name="PlaceHolder 2"/>
+          <p:cNvPr id="18" name="PlaceHolder 2"/>
           <p:cNvSpPr>
             <a:spLocks noGrp="1"/>
           </p:cNvSpPr>
@@ -374,7 +375,7 @@
             <a:spLocks noGrp="1"/>
           </p:cNvSpPr>
           <p:nvPr>
-            <p:ph type="ftr" idx="4"/>
+            <p:ph type="ftr" idx="7"/>
           </p:nvPr>
         </p:nvSpPr>
         <p:spPr/>
@@ -394,14 +395,14 @@
             <a:spLocks noGrp="1"/>
           </p:cNvSpPr>
           <p:nvPr>
-            <p:ph type="sldNum" idx="5"/>
+            <p:ph type="sldNum" idx="8"/>
           </p:nvPr>
         </p:nvSpPr>
         <p:spPr/>
         <p:txBody>
           <a:bodyPr/>
           <a:p>
-            <a:fld id="{E908759C-3F1B-4BCB-B5DB-6EB079D01393}" type="slidenum">
+            <a:fld id="{D3684F62-C368-4FD3-B3FA-40E4A6B167C8}" type="slidenum">
               <a:t>&lt;#&gt;</a:t>
             </a:fld>
           </a:p>
@@ -414,7 +415,7 @@
             <a:spLocks noGrp="1"/>
           </p:cNvSpPr>
           <p:nvPr>
-            <p:ph type="dt" idx="6"/>
+            <p:ph type="dt" idx="9"/>
           </p:nvPr>
         </p:nvSpPr>
         <p:spPr/>
@@ -463,7 +464,7 @@
         <p:spPr>
           <a:xfrm>
             <a:off x="504000" y="226080"/>
-            <a:ext cx="9071280" cy="946080"/>
+            <a:ext cx="9070920" cy="945720"/>
           </a:xfrm>
           <a:prstGeom prst="rect">
             <a:avLst/>
@@ -512,7 +513,7 @@
         <p:spPr>
           <a:xfrm>
             <a:off x="504000" y="1326600"/>
-            <a:ext cx="9071280" cy="3287880"/>
+            <a:ext cx="9071640" cy="3288240"/>
           </a:xfrm>
           <a:prstGeom prst="rect">
             <a:avLst/>
@@ -737,7 +738,7 @@
         <p:spPr>
           <a:xfrm>
             <a:off x="3447360" y="5165280"/>
-            <a:ext cx="3194640" cy="390240"/>
+            <a:ext cx="3194280" cy="389880"/>
           </a:xfrm>
           <a:prstGeom prst="rect">
             <a:avLst/>
@@ -809,7 +810,7 @@
         <p:spPr>
           <a:xfrm>
             <a:off x="7227360" y="5165280"/>
-            <a:ext cx="2347920" cy="390240"/>
+            <a:ext cx="2347560" cy="389880"/>
           </a:xfrm>
           <a:prstGeom prst="rect">
             <a:avLst/>
@@ -850,7 +851,7 @@
                 <a:tab algn="l" pos="0"/>
               </a:tabLst>
             </a:pPr>
-            <a:fld id="{1E9F46E4-C9F6-4786-B80D-1CB0D5823D8F}" type="slidenum">
+            <a:fld id="{53D6A5E6-23A2-4387-8ED3-3AED22A3B2A1}" type="slidenum">
               <a:rPr b="0" lang="en-US" sz="1400" spc="-1" strike="noStrike">
                 <a:solidFill>
                   <a:srgbClr val="000000"/>
@@ -881,7 +882,7 @@
         <p:spPr>
           <a:xfrm>
             <a:off x="504000" y="5165280"/>
-            <a:ext cx="2347920" cy="390240"/>
+            <a:ext cx="2347560" cy="389880"/>
           </a:xfrm>
           <a:prstGeom prst="rect">
             <a:avLst/>
@@ -961,13 +962,13 @@
             <a:spLocks noGrp="1"/>
           </p:cNvSpPr>
           <p:nvPr>
-            <p:ph type="title"/>
+            <p:ph type="ftr" idx="4"/>
           </p:nvPr>
         </p:nvSpPr>
         <p:spPr>
           <a:xfrm>
-            <a:off x="504000" y="226080"/>
-            <a:ext cx="9071280" cy="946080"/>
+            <a:off x="3447360" y="5165280"/>
+            <a:ext cx="3194280" cy="389880"/>
           </a:xfrm>
           <a:prstGeom prst="rect">
             <a:avLst/>
@@ -978,27 +979,50 @@
           </a:ln>
         </p:spPr>
         <p:txBody>
-          <a:bodyPr lIns="0" rIns="0" tIns="0" bIns="0" anchor="ctr">
+          <a:bodyPr lIns="0" rIns="0" tIns="0" bIns="0" anchor="t">
             <a:noAutofit/>
           </a:bodyPr>
-          <a:p>
-            <a:pPr indent="0">
+          <a:lstStyle>
+            <a:lvl1pPr indent="0" algn="ctr">
+              <a:lnSpc>
+                <a:spcPct val="100000"/>
+              </a:lnSpc>
               <a:buNone/>
-            </a:pPr>
-            <a:r>
-              <a:rPr b="0" lang="en-US" sz="1800" spc="-1" strike="noStrike">
-                <a:solidFill>
-                  <a:srgbClr val="000000"/>
-                </a:solidFill>
-                <a:latin typeface="Arial"/>
-              </a:rPr>
-              <a:t>Click to edit the title text format</a:t>
-            </a:r>
-            <a:endParaRPr b="0" lang="en-US" sz="1800" spc="-1" strike="noStrike">
-              <a:solidFill>
-                <a:srgbClr val="000000"/>
-              </a:solidFill>
-              <a:latin typeface="Arial"/>
+              <a:tabLst>
+                <a:tab algn="l" pos="0"/>
+              </a:tabLst>
+              <a:defRPr b="0" lang="en-US" sz="1400" spc="-1" strike="noStrike">
+                <a:solidFill>
+                  <a:srgbClr val="000000"/>
+                </a:solidFill>
+                <a:latin typeface="Times New Roman"/>
+              </a:defRPr>
+            </a:lvl1pPr>
+          </a:lstStyle>
+          <a:p>
+            <a:pPr indent="0" algn="ctr">
+              <a:lnSpc>
+                <a:spcPct val="100000"/>
+              </a:lnSpc>
+              <a:buNone/>
+              <a:tabLst>
+                <a:tab algn="l" pos="0"/>
+              </a:tabLst>
+            </a:pPr>
+            <a:r>
+              <a:rPr b="0" lang="en-US" sz="1400" spc="-1" strike="noStrike">
+                <a:solidFill>
+                  <a:srgbClr val="000000"/>
+                </a:solidFill>
+                <a:latin typeface="Times New Roman"/>
+              </a:rPr>
+              <a:t>&lt;footer&gt;</a:t>
+            </a:r>
+            <a:endParaRPr b="0" lang="en-US" sz="1400" spc="-1" strike="noStrike">
+              <a:solidFill>
+                <a:srgbClr val="000000"/>
+              </a:solidFill>
+              <a:latin typeface="Times New Roman"/>
             </a:endParaRPr>
           </a:p>
         </p:txBody>
@@ -1010,13 +1034,13 @@
             <a:spLocks noGrp="1"/>
           </p:cNvSpPr>
           <p:nvPr>
-            <p:ph type="ftr" idx="4"/>
+            <p:ph type="sldNum" idx="5"/>
           </p:nvPr>
         </p:nvSpPr>
         <p:spPr>
           <a:xfrm>
-            <a:off x="3447360" y="5165280"/>
-            <a:ext cx="3194640" cy="390240"/>
+            <a:off x="7227360" y="5165280"/>
+            <a:ext cx="2347560" cy="389880"/>
           </a:xfrm>
           <a:prstGeom prst="rect">
             <a:avLst/>
@@ -1031,7 +1055,7 @@
             <a:noAutofit/>
           </a:bodyPr>
           <a:lstStyle>
-            <a:lvl1pPr indent="0" algn="ctr">
+            <a:lvl1pPr indent="0" algn="r">
               <a:lnSpc>
                 <a:spcPct val="100000"/>
               </a:lnSpc>
@@ -1048,7 +1072,7 @@
             </a:lvl1pPr>
           </a:lstStyle>
           <a:p>
-            <a:pPr indent="0" algn="ctr">
+            <a:pPr indent="0" algn="r">
               <a:lnSpc>
                 <a:spcPct val="100000"/>
               </a:lnSpc>
@@ -1057,15 +1081,15 @@
                 <a:tab algn="l" pos="0"/>
               </a:tabLst>
             </a:pPr>
-            <a:r>
+            <a:fld id="{6EABD0E5-712D-4597-9BAC-03F1D67E89A9}" type="slidenum">
               <a:rPr b="0" lang="en-US" sz="1400" spc="-1" strike="noStrike">
                 <a:solidFill>
                   <a:srgbClr val="000000"/>
                 </a:solidFill>
                 <a:latin typeface="Times New Roman"/>
               </a:rPr>
-              <a:t>&lt;footer&gt;</a:t>
-            </a:r>
+              <a:t>&lt;number&gt;</a:t>
+            </a:fld>
             <a:endParaRPr b="0" lang="en-US" sz="1400" spc="-1" strike="noStrike">
               <a:solidFill>
                 <a:srgbClr val="000000"/>
@@ -1082,13 +1106,13 @@
             <a:spLocks noGrp="1"/>
           </p:cNvSpPr>
           <p:nvPr>
-            <p:ph type="sldNum" idx="5"/>
+            <p:ph type="dt" idx="6"/>
           </p:nvPr>
         </p:nvSpPr>
         <p:spPr>
           <a:xfrm>
-            <a:off x="7227360" y="5165280"/>
-            <a:ext cx="2347920" cy="390240"/>
+            <a:off x="504000" y="5165280"/>
+            <a:ext cx="2347560" cy="389880"/>
           </a:xfrm>
           <a:prstGeom prst="rect">
             <a:avLst/>
@@ -1103,14 +1127,8 @@
             <a:noAutofit/>
           </a:bodyPr>
           <a:lstStyle>
-            <a:lvl1pPr indent="0" algn="r">
-              <a:lnSpc>
-                <a:spcPct val="100000"/>
-              </a:lnSpc>
+            <a:lvl1pPr indent="0">
               <a:buNone/>
-              <a:tabLst>
-                <a:tab algn="l" pos="0"/>
-              </a:tabLst>
               <a:defRPr b="0" lang="en-US" sz="1400" spc="-1" strike="noStrike">
                 <a:solidFill>
                   <a:srgbClr val="000000"/>
@@ -1120,24 +1138,18 @@
             </a:lvl1pPr>
           </a:lstStyle>
           <a:p>
-            <a:pPr indent="0" algn="r">
-              <a:lnSpc>
-                <a:spcPct val="100000"/>
-              </a:lnSpc>
+            <a:pPr indent="0">
               <a:buNone/>
-              <a:tabLst>
-                <a:tab algn="l" pos="0"/>
-              </a:tabLst>
-            </a:pPr>
-            <a:fld id="{934DAD49-5747-469F-9425-D51BE2C0844B}" type="slidenum">
+            </a:pPr>
+            <a:r>
               <a:rPr b="0" lang="en-US" sz="1400" spc="-1" strike="noStrike">
                 <a:solidFill>
                   <a:srgbClr val="000000"/>
                 </a:solidFill>
                 <a:latin typeface="Times New Roman"/>
               </a:rPr>
-              <a:t>&lt;number&gt;</a:t>
-            </a:fld>
+              <a:t>&lt;date/time&gt;</a:t>
+            </a:r>
             <a:endParaRPr b="0" lang="en-US" sz="1400" spc="-1" strike="noStrike">
               <a:solidFill>
                 <a:srgbClr val="000000"/>
@@ -1154,13 +1166,13 @@
             <a:spLocks noGrp="1"/>
           </p:cNvSpPr>
           <p:nvPr>
-            <p:ph type="dt" idx="6"/>
+            <p:ph type="title"/>
           </p:nvPr>
         </p:nvSpPr>
         <p:spPr>
           <a:xfrm>
-            <a:off x="504000" y="5165280"/>
-            <a:ext cx="2347920" cy="390240"/>
+            <a:off x="504000" y="226080"/>
+            <a:ext cx="9072000" cy="946440"/>
           </a:xfrm>
           <a:prstGeom prst="rect">
             <a:avLst/>
@@ -1171,38 +1183,27 @@
           </a:ln>
         </p:spPr>
         <p:txBody>
-          <a:bodyPr lIns="0" rIns="0" tIns="0" bIns="0" anchor="t">
+          <a:bodyPr lIns="0" rIns="0" tIns="0" bIns="0" anchor="ctr">
             <a:noAutofit/>
           </a:bodyPr>
-          <a:lstStyle>
-            <a:lvl1pPr indent="0">
+          <a:p>
+            <a:pPr indent="0" algn="ctr">
               <a:buNone/>
-              <a:defRPr b="0" lang="en-US" sz="1400" spc="-1" strike="noStrike">
-                <a:solidFill>
-                  <a:srgbClr val="000000"/>
-                </a:solidFill>
-                <a:latin typeface="Times New Roman"/>
-              </a:defRPr>
-            </a:lvl1pPr>
-          </a:lstStyle>
-          <a:p>
-            <a:pPr indent="0">
-              <a:buNone/>
-            </a:pPr>
-            <a:r>
-              <a:rPr b="0" lang="en-US" sz="1400" spc="-1" strike="noStrike">
-                <a:solidFill>
-                  <a:srgbClr val="000000"/>
-                </a:solidFill>
-                <a:latin typeface="Times New Roman"/>
-              </a:rPr>
-              <a:t>&lt;date/time&gt;</a:t>
-            </a:r>
-            <a:endParaRPr b="0" lang="en-US" sz="1400" spc="-1" strike="noStrike">
-              <a:solidFill>
-                <a:srgbClr val="000000"/>
-              </a:solidFill>
-              <a:latin typeface="Times New Roman"/>
+            </a:pPr>
+            <a:r>
+              <a:rPr b="0" lang="en-US" sz="4400" spc="-1" strike="noStrike">
+                <a:solidFill>
+                  <a:srgbClr val="000000"/>
+                </a:solidFill>
+                <a:latin typeface="Arial"/>
+              </a:rPr>
+              <a:t>Click to edit the title text format</a:t>
+            </a:r>
+            <a:endParaRPr b="0" lang="en-US" sz="4400" spc="-1" strike="noStrike">
+              <a:solidFill>
+                <a:srgbClr val="000000"/>
+              </a:solidFill>
+              <a:latin typeface="Arial"/>
             </a:endParaRPr>
           </a:p>
         </p:txBody>
@@ -1437,7 +1438,510 @@
   <p:clrMap bg1="lt1" bg2="lt2" tx1="dk1" tx2="dk2" accent1="accent1" accent2="accent2" accent3="accent3" accent4="accent4" accent5="accent5" accent6="accent6" hlink="hlink" folHlink="folHlink"/>
   <p:sldLayoutIdLst>
     <p:sldLayoutId id="2147483651" r:id="rId2"/>
-    <p:sldLayoutId id="2147483652" r:id="rId3"/>
+  </p:sldLayoutIdLst>
+</p:sldMaster>
+</file>
+
+<file path=ppt/slideMasters/slideMaster3.xml><?xml version="1.0" encoding="utf-8"?>
+<p:sldMaster xmlns:a="http://schemas.openxmlformats.org/drawingml/2006/main" xmlns:p="http://schemas.openxmlformats.org/presentationml/2006/main" xmlns:r="http://schemas.openxmlformats.org/officeDocument/2006/relationships" xmlns:p14="http://schemas.microsoft.com/office/powerpoint/2010/main" xmlns:p15="http://schemas.microsoft.com/office/powerpoint/2012/main" xmlns:mc="http://schemas.openxmlformats.org/markup-compatibility/2006">
+  <p:cSld>
+    <p:spTree>
+      <p:nvGrpSpPr>
+        <p:cNvPr id="1" name=""/>
+        <p:cNvGrpSpPr/>
+        <p:nvPr/>
+      </p:nvGrpSpPr>
+      <p:grpSpPr>
+        <a:xfrm>
+          <a:off x="0" y="0"/>
+          <a:ext cx="0" cy="0"/>
+          <a:chOff x="0" y="0"/>
+          <a:chExt cx="0" cy="0"/>
+        </a:xfrm>
+      </p:grpSpPr>
+      <p:sp>
+        <p:nvSpPr>
+          <p:cNvPr id="12" name="PlaceHolder 1"/>
+          <p:cNvSpPr>
+            <a:spLocks noGrp="1"/>
+          </p:cNvSpPr>
+          <p:nvPr>
+            <p:ph type="title"/>
+          </p:nvPr>
+        </p:nvSpPr>
+        <p:spPr>
+          <a:xfrm>
+            <a:off x="504000" y="226080"/>
+            <a:ext cx="9070920" cy="945720"/>
+          </a:xfrm>
+          <a:prstGeom prst="rect">
+            <a:avLst/>
+          </a:prstGeom>
+          <a:noFill/>
+          <a:ln w="0">
+            <a:noFill/>
+          </a:ln>
+        </p:spPr>
+        <p:txBody>
+          <a:bodyPr lIns="0" rIns="0" tIns="0" bIns="0" anchor="ctr">
+            <a:noAutofit/>
+          </a:bodyPr>
+          <a:p>
+            <a:pPr indent="0">
+              <a:buNone/>
+            </a:pPr>
+            <a:r>
+              <a:rPr b="0" lang="en-US" sz="1800" spc="-1" strike="noStrike">
+                <a:solidFill>
+                  <a:srgbClr val="000000"/>
+                </a:solidFill>
+                <a:latin typeface="Arial"/>
+              </a:rPr>
+              <a:t>Click to edit the title text format</a:t>
+            </a:r>
+            <a:endParaRPr b="0" lang="en-US" sz="1800" spc="-1" strike="noStrike">
+              <a:solidFill>
+                <a:srgbClr val="000000"/>
+              </a:solidFill>
+              <a:latin typeface="Arial"/>
+            </a:endParaRPr>
+          </a:p>
+        </p:txBody>
+      </p:sp>
+      <p:sp>
+        <p:nvSpPr>
+          <p:cNvPr id="13" name="PlaceHolder 2"/>
+          <p:cNvSpPr>
+            <a:spLocks noGrp="1"/>
+          </p:cNvSpPr>
+          <p:nvPr>
+            <p:ph type="ftr" idx="7"/>
+          </p:nvPr>
+        </p:nvSpPr>
+        <p:spPr>
+          <a:xfrm>
+            <a:off x="3447360" y="5165280"/>
+            <a:ext cx="3194280" cy="389880"/>
+          </a:xfrm>
+          <a:prstGeom prst="rect">
+            <a:avLst/>
+          </a:prstGeom>
+          <a:noFill/>
+          <a:ln w="0">
+            <a:noFill/>
+          </a:ln>
+        </p:spPr>
+        <p:txBody>
+          <a:bodyPr lIns="0" rIns="0" tIns="0" bIns="0" anchor="t">
+            <a:noAutofit/>
+          </a:bodyPr>
+          <a:lstStyle>
+            <a:lvl1pPr indent="0" algn="ctr">
+              <a:lnSpc>
+                <a:spcPct val="100000"/>
+              </a:lnSpc>
+              <a:buNone/>
+              <a:tabLst>
+                <a:tab algn="l" pos="0"/>
+              </a:tabLst>
+              <a:defRPr b="0" lang="en-US" sz="1400" spc="-1" strike="noStrike">
+                <a:solidFill>
+                  <a:srgbClr val="000000"/>
+                </a:solidFill>
+                <a:latin typeface="Times New Roman"/>
+              </a:defRPr>
+            </a:lvl1pPr>
+          </a:lstStyle>
+          <a:p>
+            <a:pPr indent="0" algn="ctr">
+              <a:lnSpc>
+                <a:spcPct val="100000"/>
+              </a:lnSpc>
+              <a:buNone/>
+              <a:tabLst>
+                <a:tab algn="l" pos="0"/>
+              </a:tabLst>
+            </a:pPr>
+            <a:r>
+              <a:rPr b="0" lang="en-US" sz="1400" spc="-1" strike="noStrike">
+                <a:solidFill>
+                  <a:srgbClr val="000000"/>
+                </a:solidFill>
+                <a:latin typeface="Times New Roman"/>
+              </a:rPr>
+              <a:t>&lt;footer&gt;</a:t>
+            </a:r>
+            <a:endParaRPr b="0" lang="en-US" sz="1400" spc="-1" strike="noStrike">
+              <a:solidFill>
+                <a:srgbClr val="000000"/>
+              </a:solidFill>
+              <a:latin typeface="Times New Roman"/>
+            </a:endParaRPr>
+          </a:p>
+        </p:txBody>
+      </p:sp>
+      <p:sp>
+        <p:nvSpPr>
+          <p:cNvPr id="14" name="PlaceHolder 3"/>
+          <p:cNvSpPr>
+            <a:spLocks noGrp="1"/>
+          </p:cNvSpPr>
+          <p:nvPr>
+            <p:ph type="sldNum" idx="8"/>
+          </p:nvPr>
+        </p:nvSpPr>
+        <p:spPr>
+          <a:xfrm>
+            <a:off x="7227360" y="5165280"/>
+            <a:ext cx="2347560" cy="389880"/>
+          </a:xfrm>
+          <a:prstGeom prst="rect">
+            <a:avLst/>
+          </a:prstGeom>
+          <a:noFill/>
+          <a:ln w="0">
+            <a:noFill/>
+          </a:ln>
+        </p:spPr>
+        <p:txBody>
+          <a:bodyPr lIns="0" rIns="0" tIns="0" bIns="0" anchor="t">
+            <a:noAutofit/>
+          </a:bodyPr>
+          <a:lstStyle>
+            <a:lvl1pPr indent="0" algn="r">
+              <a:lnSpc>
+                <a:spcPct val="100000"/>
+              </a:lnSpc>
+              <a:buNone/>
+              <a:tabLst>
+                <a:tab algn="l" pos="0"/>
+              </a:tabLst>
+              <a:defRPr b="0" lang="en-US" sz="1400" spc="-1" strike="noStrike">
+                <a:solidFill>
+                  <a:srgbClr val="000000"/>
+                </a:solidFill>
+                <a:latin typeface="Times New Roman"/>
+              </a:defRPr>
+            </a:lvl1pPr>
+          </a:lstStyle>
+          <a:p>
+            <a:pPr indent="0" algn="r">
+              <a:lnSpc>
+                <a:spcPct val="100000"/>
+              </a:lnSpc>
+              <a:buNone/>
+              <a:tabLst>
+                <a:tab algn="l" pos="0"/>
+              </a:tabLst>
+            </a:pPr>
+            <a:fld id="{C5E2081D-7464-4994-8DBB-06CFE8DDC3CF}" type="slidenum">
+              <a:rPr b="0" lang="en-US" sz="1400" spc="-1" strike="noStrike">
+                <a:solidFill>
+                  <a:srgbClr val="000000"/>
+                </a:solidFill>
+                <a:latin typeface="Times New Roman"/>
+              </a:rPr>
+              <a:t>&lt;number&gt;</a:t>
+            </a:fld>
+            <a:endParaRPr b="0" lang="en-US" sz="1400" spc="-1" strike="noStrike">
+              <a:solidFill>
+                <a:srgbClr val="000000"/>
+              </a:solidFill>
+              <a:latin typeface="Times New Roman"/>
+            </a:endParaRPr>
+          </a:p>
+        </p:txBody>
+      </p:sp>
+      <p:sp>
+        <p:nvSpPr>
+          <p:cNvPr id="15" name="PlaceHolder 4"/>
+          <p:cNvSpPr>
+            <a:spLocks noGrp="1"/>
+          </p:cNvSpPr>
+          <p:nvPr>
+            <p:ph type="dt" idx="9"/>
+          </p:nvPr>
+        </p:nvSpPr>
+        <p:spPr>
+          <a:xfrm>
+            <a:off x="504000" y="5165280"/>
+            <a:ext cx="2347560" cy="389880"/>
+          </a:xfrm>
+          <a:prstGeom prst="rect">
+            <a:avLst/>
+          </a:prstGeom>
+          <a:noFill/>
+          <a:ln w="0">
+            <a:noFill/>
+          </a:ln>
+        </p:spPr>
+        <p:txBody>
+          <a:bodyPr lIns="0" rIns="0" tIns="0" bIns="0" anchor="t">
+            <a:noAutofit/>
+          </a:bodyPr>
+          <a:lstStyle>
+            <a:lvl1pPr indent="0">
+              <a:buNone/>
+              <a:defRPr b="0" lang="en-US" sz="1400" spc="-1" strike="noStrike">
+                <a:solidFill>
+                  <a:srgbClr val="000000"/>
+                </a:solidFill>
+                <a:latin typeface="Times New Roman"/>
+              </a:defRPr>
+            </a:lvl1pPr>
+          </a:lstStyle>
+          <a:p>
+            <a:pPr indent="0">
+              <a:buNone/>
+            </a:pPr>
+            <a:r>
+              <a:rPr b="0" lang="en-US" sz="1400" spc="-1" strike="noStrike">
+                <a:solidFill>
+                  <a:srgbClr val="000000"/>
+                </a:solidFill>
+                <a:latin typeface="Times New Roman"/>
+              </a:rPr>
+              <a:t>&lt;date/time&gt;</a:t>
+            </a:r>
+            <a:endParaRPr b="0" lang="en-US" sz="1400" spc="-1" strike="noStrike">
+              <a:solidFill>
+                <a:srgbClr val="000000"/>
+              </a:solidFill>
+              <a:latin typeface="Times New Roman"/>
+            </a:endParaRPr>
+          </a:p>
+        </p:txBody>
+      </p:sp>
+      <p:sp>
+        <p:nvSpPr>
+          <p:cNvPr id="16" name="PlaceHolder 5"/>
+          <p:cNvSpPr>
+            <a:spLocks noGrp="1"/>
+          </p:cNvSpPr>
+          <p:nvPr>
+            <p:ph type="body"/>
+          </p:nvPr>
+        </p:nvSpPr>
+        <p:spPr>
+          <a:xfrm>
+            <a:off x="504000" y="1326600"/>
+            <a:ext cx="9072000" cy="3288600"/>
+          </a:xfrm>
+          <a:prstGeom prst="rect">
+            <a:avLst/>
+          </a:prstGeom>
+          <a:noFill/>
+          <a:ln w="0">
+            <a:noFill/>
+          </a:ln>
+        </p:spPr>
+        <p:txBody>
+          <a:bodyPr lIns="0" rIns="0" tIns="0" bIns="0" anchor="t">
+            <a:normAutofit/>
+          </a:bodyPr>
+          <a:p>
+            <a:pPr marL="432000" indent="-324000">
+              <a:spcBef>
+                <a:spcPts val="1417"/>
+              </a:spcBef>
+              <a:buClr>
+                <a:srgbClr val="000000"/>
+              </a:buClr>
+              <a:buSzPct val="45000"/>
+              <a:buFont typeface="Wingdings" charset="2"/>
+              <a:buChar char=""/>
+            </a:pPr>
+            <a:r>
+              <a:rPr b="0" lang="en-US" sz="3200" spc="-1" strike="noStrike">
+                <a:solidFill>
+                  <a:srgbClr val="000000"/>
+                </a:solidFill>
+                <a:latin typeface="Arial"/>
+              </a:rPr>
+              <a:t>Click to edit the outline text format</a:t>
+            </a:r>
+            <a:endParaRPr b="0" lang="en-US" sz="3200" spc="-1" strike="noStrike">
+              <a:solidFill>
+                <a:srgbClr val="000000"/>
+              </a:solidFill>
+              <a:latin typeface="Arial"/>
+            </a:endParaRPr>
+          </a:p>
+          <a:p>
+            <a:pPr lvl="1" marL="864000" indent="-324000">
+              <a:spcBef>
+                <a:spcPts val="1134"/>
+              </a:spcBef>
+              <a:buClr>
+                <a:srgbClr val="000000"/>
+              </a:buClr>
+              <a:buSzPct val="75000"/>
+              <a:buFont typeface="Symbol" charset="2"/>
+              <a:buChar char=""/>
+            </a:pPr>
+            <a:r>
+              <a:rPr b="0" lang="en-US" sz="2800" spc="-1" strike="noStrike">
+                <a:solidFill>
+                  <a:srgbClr val="000000"/>
+                </a:solidFill>
+                <a:latin typeface="Arial"/>
+              </a:rPr>
+              <a:t>Second Outline Level</a:t>
+            </a:r>
+            <a:endParaRPr b="0" lang="en-US" sz="2800" spc="-1" strike="noStrike">
+              <a:solidFill>
+                <a:srgbClr val="000000"/>
+              </a:solidFill>
+              <a:latin typeface="Arial"/>
+            </a:endParaRPr>
+          </a:p>
+          <a:p>
+            <a:pPr lvl="2" marL="1296000" indent="-288000">
+              <a:spcBef>
+                <a:spcPts val="850"/>
+              </a:spcBef>
+              <a:buClr>
+                <a:srgbClr val="000000"/>
+              </a:buClr>
+              <a:buSzPct val="45000"/>
+              <a:buFont typeface="Wingdings" charset="2"/>
+              <a:buChar char=""/>
+            </a:pPr>
+            <a:r>
+              <a:rPr b="0" lang="en-US" sz="2400" spc="-1" strike="noStrike">
+                <a:solidFill>
+                  <a:srgbClr val="000000"/>
+                </a:solidFill>
+                <a:latin typeface="Arial"/>
+              </a:rPr>
+              <a:t>Third Outline Level</a:t>
+            </a:r>
+            <a:endParaRPr b="0" lang="en-US" sz="2400" spc="-1" strike="noStrike">
+              <a:solidFill>
+                <a:srgbClr val="000000"/>
+              </a:solidFill>
+              <a:latin typeface="Arial"/>
+            </a:endParaRPr>
+          </a:p>
+          <a:p>
+            <a:pPr lvl="3" marL="1728000" indent="-216000">
+              <a:spcBef>
+                <a:spcPts val="567"/>
+              </a:spcBef>
+              <a:buClr>
+                <a:srgbClr val="000000"/>
+              </a:buClr>
+              <a:buSzPct val="75000"/>
+              <a:buFont typeface="Symbol" charset="2"/>
+              <a:buChar char=""/>
+            </a:pPr>
+            <a:r>
+              <a:rPr b="0" lang="en-US" sz="2000" spc="-1" strike="noStrike">
+                <a:solidFill>
+                  <a:srgbClr val="000000"/>
+                </a:solidFill>
+                <a:latin typeface="Arial"/>
+              </a:rPr>
+              <a:t>Fourth Outline Level</a:t>
+            </a:r>
+            <a:endParaRPr b="0" lang="en-US" sz="2000" spc="-1" strike="noStrike">
+              <a:solidFill>
+                <a:srgbClr val="000000"/>
+              </a:solidFill>
+              <a:latin typeface="Arial"/>
+            </a:endParaRPr>
+          </a:p>
+          <a:p>
+            <a:pPr lvl="4" marL="2160000" indent="-216000">
+              <a:spcBef>
+                <a:spcPts val="283"/>
+              </a:spcBef>
+              <a:buClr>
+                <a:srgbClr val="000000"/>
+              </a:buClr>
+              <a:buSzPct val="45000"/>
+              <a:buFont typeface="Wingdings" charset="2"/>
+              <a:buChar char=""/>
+            </a:pPr>
+            <a:r>
+              <a:rPr b="0" lang="en-US" sz="2000" spc="-1" strike="noStrike">
+                <a:solidFill>
+                  <a:srgbClr val="000000"/>
+                </a:solidFill>
+                <a:latin typeface="Arial"/>
+              </a:rPr>
+              <a:t>Fifth Outline Level</a:t>
+            </a:r>
+            <a:endParaRPr b="0" lang="en-US" sz="2000" spc="-1" strike="noStrike">
+              <a:solidFill>
+                <a:srgbClr val="000000"/>
+              </a:solidFill>
+              <a:latin typeface="Arial"/>
+            </a:endParaRPr>
+          </a:p>
+          <a:p>
+            <a:pPr lvl="5" marL="2592000" indent="-216000">
+              <a:spcBef>
+                <a:spcPts val="283"/>
+              </a:spcBef>
+              <a:buClr>
+                <a:srgbClr val="000000"/>
+              </a:buClr>
+              <a:buSzPct val="45000"/>
+              <a:buFont typeface="Wingdings" charset="2"/>
+              <a:buChar char=""/>
+            </a:pPr>
+            <a:r>
+              <a:rPr b="0" lang="en-US" sz="2000" spc="-1" strike="noStrike">
+                <a:solidFill>
+                  <a:srgbClr val="000000"/>
+                </a:solidFill>
+                <a:latin typeface="Arial"/>
+              </a:rPr>
+              <a:t>Sixth Outline Level</a:t>
+            </a:r>
+            <a:endParaRPr b="0" lang="en-US" sz="2000" spc="-1" strike="noStrike">
+              <a:solidFill>
+                <a:srgbClr val="000000"/>
+              </a:solidFill>
+              <a:latin typeface="Arial"/>
+            </a:endParaRPr>
+          </a:p>
+          <a:p>
+            <a:pPr lvl="6" marL="3024000" indent="-216000">
+              <a:spcBef>
+                <a:spcPts val="283"/>
+              </a:spcBef>
+              <a:buClr>
+                <a:srgbClr val="000000"/>
+              </a:buClr>
+              <a:buSzPct val="45000"/>
+              <a:buFont typeface="Wingdings" charset="2"/>
+              <a:buChar char=""/>
+            </a:pPr>
+            <a:r>
+              <a:rPr b="0" lang="en-US" sz="2000" spc="-1" strike="noStrike">
+                <a:solidFill>
+                  <a:srgbClr val="000000"/>
+                </a:solidFill>
+                <a:latin typeface="Arial"/>
+              </a:rPr>
+              <a:t>Seventh Outline Level</a:t>
+            </a:r>
+            <a:endParaRPr b="0" lang="en-US" sz="2000" spc="-1" strike="noStrike">
+              <a:solidFill>
+                <a:srgbClr val="000000"/>
+              </a:solidFill>
+              <a:latin typeface="Arial"/>
+            </a:endParaRPr>
+          </a:p>
+        </p:txBody>
+      </p:sp>
+    </p:spTree>
+  </p:cSld>
+  <p:clrMap bg1="lt1" bg2="lt2" tx1="dk1" tx2="dk2" accent1="accent1" accent2="accent2" accent3="accent3" accent4="accent4" accent5="accent5" accent6="accent6" hlink="hlink" folHlink="folHlink"/>
+  <p:sldLayoutIdLst>
+    <p:sldLayoutId id="2147483653" r:id="rId2"/>
   </p:sldLayoutIdLst>
 </p:sldMaster>
 </file>
@@ -1461,7 +1965,7 @@
       </p:grpSpPr>
       <p:sp>
         <p:nvSpPr>
-          <p:cNvPr id="14" name="PlaceHolder 1"/>
+          <p:cNvPr id="19" name="PlaceHolder 1"/>
           <p:cNvSpPr>
             <a:spLocks noGrp="1"/>
           </p:cNvSpPr>
@@ -1472,7 +1976,7 @@
         <p:spPr>
           <a:xfrm>
             <a:off x="504000" y="226080"/>
-            <a:ext cx="9071280" cy="946080"/>
+            <a:ext cx="9070920" cy="945720"/>
           </a:xfrm>
           <a:prstGeom prst="rect">
             <a:avLst/>
@@ -1492,6 +1996,9 @@
                 <a:spcPct val="100000"/>
               </a:lnSpc>
               <a:buNone/>
+              <a:tabLst>
+                <a:tab algn="l" pos="0"/>
+              </a:tabLst>
             </a:pPr>
             <a:r>
               <a:rPr b="0" lang="en-US" sz="3000" spc="-1" strike="noStrike">
@@ -1513,7 +2020,7 @@
       </p:sp>
       <p:sp>
         <p:nvSpPr>
-          <p:cNvPr id="15" name="PlaceHolder 2"/>
+          <p:cNvPr id="20" name="PlaceHolder 2"/>
           <p:cNvSpPr>
             <a:spLocks noGrp="1"/>
           </p:cNvSpPr>
@@ -1524,7 +2031,7 @@
         <p:spPr>
           <a:xfrm>
             <a:off x="504000" y="1326600"/>
-            <a:ext cx="9071280" cy="3287880"/>
+            <a:ext cx="9070920" cy="3287520"/>
           </a:xfrm>
           <a:prstGeom prst="rect">
             <a:avLst/>
@@ -1540,6 +2047,9 @@
           </a:bodyPr>
           <a:p>
             <a:pPr marL="216000" indent="-216000">
+              <a:lnSpc>
+                <a:spcPct val="100000"/>
+              </a:lnSpc>
               <a:buClr>
                 <a:srgbClr val="000000"/>
               </a:buClr>
@@ -1565,6 +2075,9 @@
           </a:p>
           <a:p>
             <a:pPr marL="216000" indent="-216000">
+              <a:lnSpc>
+                <a:spcPct val="100000"/>
+              </a:lnSpc>
               <a:buClr>
                 <a:srgbClr val="000000"/>
               </a:buClr>
@@ -1590,6 +2103,9 @@
           </a:p>
           <a:p>
             <a:pPr marL="216000" indent="-216000">
+              <a:lnSpc>
+                <a:spcPct val="100000"/>
+              </a:lnSpc>
               <a:buClr>
                 <a:srgbClr val="000000"/>
               </a:buClr>
@@ -1647,7 +2163,7 @@
       </p:grpSpPr>
       <p:sp>
         <p:nvSpPr>
-          <p:cNvPr id="16" name="PlaceHolder 1"/>
+          <p:cNvPr id="21" name="PlaceHolder 1"/>
           <p:cNvSpPr>
             <a:spLocks noGrp="1"/>
           </p:cNvSpPr>
@@ -1658,7 +2174,7 @@
         <p:spPr>
           <a:xfrm>
             <a:off x="504000" y="226080"/>
-            <a:ext cx="9071280" cy="946080"/>
+            <a:ext cx="9070920" cy="945720"/>
           </a:xfrm>
           <a:prstGeom prst="rect">
             <a:avLst/>
@@ -1678,6 +2194,9 @@
                 <a:spcPct val="100000"/>
               </a:lnSpc>
               <a:buNone/>
+              <a:tabLst>
+                <a:tab algn="l" pos="0"/>
+              </a:tabLst>
             </a:pPr>
             <a:r>
               <a:rPr b="0" lang="en-US" sz="3000" spc="-1" strike="noStrike">
@@ -1699,7 +2218,7 @@
       </p:sp>
       <p:sp>
         <p:nvSpPr>
-          <p:cNvPr id="17" name="PlaceHolder 2"/>
+          <p:cNvPr id="22" name="PlaceHolder 2"/>
           <p:cNvSpPr>
             <a:spLocks noGrp="1"/>
           </p:cNvSpPr>
@@ -1710,7 +2229,7 @@
         <p:spPr>
           <a:xfrm>
             <a:off x="504000" y="1326600"/>
-            <a:ext cx="9071280" cy="3287880"/>
+            <a:ext cx="9070920" cy="3287520"/>
           </a:xfrm>
           <a:prstGeom prst="rect">
             <a:avLst/>
@@ -1726,6 +2245,9 @@
           </a:bodyPr>
           <a:p>
             <a:pPr marL="216000" indent="-216000">
+              <a:lnSpc>
+                <a:spcPct val="100000"/>
+              </a:lnSpc>
               <a:buClr>
                 <a:srgbClr val="000000"/>
               </a:buClr>
@@ -1751,6 +2273,9 @@
           </a:p>
           <a:p>
             <a:pPr marL="216000" indent="-216000">
+              <a:lnSpc>
+                <a:spcPct val="100000"/>
+              </a:lnSpc>
               <a:buClr>
                 <a:srgbClr val="000000"/>
               </a:buClr>
@@ -1776,6 +2301,9 @@
           </a:p>
           <a:p>
             <a:pPr marL="216000" indent="-216000">
+              <a:lnSpc>
+                <a:spcPct val="100000"/>
+              </a:lnSpc>
               <a:buClr>
                 <a:srgbClr val="000000"/>
               </a:buClr>
@@ -1801,6 +2329,9 @@
           </a:p>
           <a:p>
             <a:pPr marL="216000" indent="-216000">
+              <a:lnSpc>
+                <a:spcPct val="100000"/>
+              </a:lnSpc>
               <a:buClr>
                 <a:srgbClr val="000000"/>
               </a:buClr>
@@ -1826,6 +2357,9 @@
           </a:p>
           <a:p>
             <a:pPr marL="216000" indent="-216000">
+              <a:lnSpc>
+                <a:spcPct val="100000"/>
+              </a:lnSpc>
               <a:buClr>
                 <a:srgbClr val="000000"/>
               </a:buClr>
@@ -1883,7 +2417,7 @@
       </p:grpSpPr>
       <p:sp>
         <p:nvSpPr>
-          <p:cNvPr id="18" name="PlaceHolder 1"/>
+          <p:cNvPr id="23" name="PlaceHolder 1"/>
           <p:cNvSpPr>
             <a:spLocks noGrp="1"/>
           </p:cNvSpPr>
@@ -1894,7 +2428,7 @@
         <p:spPr>
           <a:xfrm>
             <a:off x="504000" y="226080"/>
-            <a:ext cx="9071280" cy="946080"/>
+            <a:ext cx="9070920" cy="945720"/>
           </a:xfrm>
           <a:prstGeom prst="rect">
             <a:avLst/>
@@ -1914,6 +2448,9 @@
                 <a:spcPct val="100000"/>
               </a:lnSpc>
               <a:buNone/>
+              <a:tabLst>
+                <a:tab algn="l" pos="0"/>
+              </a:tabLst>
             </a:pPr>
             <a:r>
               <a:rPr b="0" lang="en-US" sz="3000" spc="-1" strike="noStrike">
@@ -1935,7 +2472,7 @@
       </p:sp>
       <p:sp>
         <p:nvSpPr>
-          <p:cNvPr id="19" name="PlaceHolder 2"/>
+          <p:cNvPr id="24" name="PlaceHolder 2"/>
           <p:cNvSpPr>
             <a:spLocks noGrp="1"/>
           </p:cNvSpPr>
@@ -1946,7 +2483,7 @@
         <p:spPr>
           <a:xfrm>
             <a:off x="504000" y="1326600"/>
-            <a:ext cx="9071280" cy="3287880"/>
+            <a:ext cx="9070920" cy="3287520"/>
           </a:xfrm>
           <a:prstGeom prst="rect">
             <a:avLst/>
@@ -1962,6 +2499,9 @@
           </a:bodyPr>
           <a:p>
             <a:pPr marL="216000" indent="-216000">
+              <a:lnSpc>
+                <a:spcPct val="100000"/>
+              </a:lnSpc>
               <a:buClr>
                 <a:srgbClr val="000000"/>
               </a:buClr>
@@ -1987,6 +2527,9 @@
           </a:p>
           <a:p>
             <a:pPr marL="216000" indent="-216000">
+              <a:lnSpc>
+                <a:spcPct val="100000"/>
+              </a:lnSpc>
               <a:buClr>
                 <a:srgbClr val="000000"/>
               </a:buClr>
@@ -2012,6 +2555,9 @@
           </a:p>
           <a:p>
             <a:pPr marL="216000" indent="-216000">
+              <a:lnSpc>
+                <a:spcPct val="100000"/>
+              </a:lnSpc>
               <a:buClr>
                 <a:srgbClr val="000000"/>
               </a:buClr>
@@ -2069,7 +2615,7 @@
       </p:grpSpPr>
       <p:sp>
         <p:nvSpPr>
-          <p:cNvPr id="20" name="PlaceHolder 1"/>
+          <p:cNvPr id="25" name="PlaceHolder 1"/>
           <p:cNvSpPr>
             <a:spLocks noGrp="1"/>
           </p:cNvSpPr>
@@ -2080,7 +2626,7 @@
         <p:spPr>
           <a:xfrm>
             <a:off x="504000" y="226080"/>
-            <a:ext cx="9071280" cy="946080"/>
+            <a:ext cx="9070920" cy="945720"/>
           </a:xfrm>
           <a:prstGeom prst="rect">
             <a:avLst/>
@@ -2100,6 +2646,9 @@
                 <a:spcPct val="100000"/>
               </a:lnSpc>
               <a:buNone/>
+              <a:tabLst>
+                <a:tab algn="l" pos="0"/>
+              </a:tabLst>
             </a:pPr>
             <a:r>
               <a:rPr b="0" lang="en-US" sz="3000" spc="-1" strike="noStrike">
@@ -2121,7 +2670,7 @@
       </p:sp>
       <p:sp>
         <p:nvSpPr>
-          <p:cNvPr id="21" name="PlaceHolder 2"/>
+          <p:cNvPr id="26" name="PlaceHolder 2"/>
           <p:cNvSpPr>
             <a:spLocks noGrp="1"/>
           </p:cNvSpPr>
@@ -2132,7 +2681,7 @@
         <p:spPr>
           <a:xfrm>
             <a:off x="504000" y="1326600"/>
-            <a:ext cx="9071280" cy="3287880"/>
+            <a:ext cx="9070920" cy="3287520"/>
           </a:xfrm>
           <a:prstGeom prst="rect">
             <a:avLst/>
@@ -2148,6 +2697,9 @@
           </a:bodyPr>
           <a:p>
             <a:pPr marL="216000" indent="-216000">
+              <a:lnSpc>
+                <a:spcPct val="100000"/>
+              </a:lnSpc>
               <a:buClr>
                 <a:srgbClr val="000000"/>
               </a:buClr>
@@ -2205,7 +2757,7 @@
       </p:grpSpPr>
       <p:sp>
         <p:nvSpPr>
-          <p:cNvPr id="22" name="PlaceHolder 1"/>
+          <p:cNvPr id="27" name="PlaceHolder 1"/>
           <p:cNvSpPr>
             <a:spLocks noGrp="1"/>
           </p:cNvSpPr>
@@ -2216,7 +2768,7 @@
         <p:spPr>
           <a:xfrm>
             <a:off x="504000" y="226080"/>
-            <a:ext cx="9071280" cy="946080"/>
+            <a:ext cx="9070920" cy="945720"/>
           </a:xfrm>
           <a:prstGeom prst="rect">
             <a:avLst/>
@@ -2236,6 +2788,9 @@
                 <a:spcPct val="100000"/>
               </a:lnSpc>
               <a:buNone/>
+              <a:tabLst>
+                <a:tab algn="l" pos="0"/>
+              </a:tabLst>
             </a:pPr>
             <a:r>
               <a:rPr b="0" lang="en-US" sz="3000" spc="-1" strike="noStrike">
@@ -2257,7 +2812,7 @@
       </p:sp>
       <p:sp>
         <p:nvSpPr>
-          <p:cNvPr id="23" name="PlaceHolder 2"/>
+          <p:cNvPr id="28" name="PlaceHolder 2"/>
           <p:cNvSpPr>
             <a:spLocks noGrp="1"/>
           </p:cNvSpPr>
@@ -2268,7 +2823,7 @@
         <p:spPr>
           <a:xfrm>
             <a:off x="504000" y="1326600"/>
-            <a:ext cx="9071280" cy="3287880"/>
+            <a:ext cx="9070920" cy="3287520"/>
           </a:xfrm>
           <a:prstGeom prst="rect">
             <a:avLst/>
@@ -2284,6 +2839,9 @@
           </a:bodyPr>
           <a:p>
             <a:pPr marL="216000" indent="-216000">
+              <a:lnSpc>
+                <a:spcPct val="100000"/>
+              </a:lnSpc>
               <a:buClr>
                 <a:srgbClr val="000000"/>
               </a:buClr>
@@ -2309,6 +2867,9 @@
           </a:p>
           <a:p>
             <a:pPr marL="216000" indent="-216000">
+              <a:lnSpc>
+                <a:spcPct val="100000"/>
+              </a:lnSpc>
               <a:buClr>
                 <a:srgbClr val="000000"/>
               </a:buClr>
@@ -2334,6 +2895,9 @@
           </a:p>
           <a:p>
             <a:pPr marL="216000" indent="-216000">
+              <a:lnSpc>
+                <a:spcPct val="100000"/>
+              </a:lnSpc>
               <a:buClr>
                 <a:srgbClr val="000000"/>
               </a:buClr>
@@ -2359,6 +2923,9 @@
           </a:p>
           <a:p>
             <a:pPr marL="216000" indent="-216000">
+              <a:lnSpc>
+                <a:spcPct val="100000"/>
+              </a:lnSpc>
               <a:buClr>
                 <a:srgbClr val="000000"/>
               </a:buClr>
@@ -2416,7 +2983,7 @@
       </p:grpSpPr>
       <p:sp>
         <p:nvSpPr>
-          <p:cNvPr id="24" name="PlaceHolder 1"/>
+          <p:cNvPr id="29" name="PlaceHolder 1"/>
           <p:cNvSpPr>
             <a:spLocks noGrp="1"/>
           </p:cNvSpPr>
@@ -2427,7 +2994,7 @@
         <p:spPr>
           <a:xfrm>
             <a:off x="504000" y="226080"/>
-            <a:ext cx="9071280" cy="946080"/>
+            <a:ext cx="9070920" cy="945720"/>
           </a:xfrm>
           <a:prstGeom prst="rect">
             <a:avLst/>
@@ -2447,6 +3014,9 @@
                 <a:spcPct val="100000"/>
               </a:lnSpc>
               <a:buNone/>
+              <a:tabLst>
+                <a:tab algn="l" pos="0"/>
+              </a:tabLst>
             </a:pPr>
             <a:r>
               <a:rPr b="0" lang="en-US" sz="3000" spc="-1" strike="noStrike">
@@ -2468,7 +3038,7 @@
       </p:sp>
       <p:sp>
         <p:nvSpPr>
-          <p:cNvPr id="25" name="PlaceHolder 2"/>
+          <p:cNvPr id="30" name="PlaceHolder 2"/>
           <p:cNvSpPr>
             <a:spLocks noGrp="1"/>
           </p:cNvSpPr>
@@ -2479,7 +3049,7 @@
         <p:spPr>
           <a:xfrm>
             <a:off x="504000" y="1326600"/>
-            <a:ext cx="9071280" cy="3287880"/>
+            <a:ext cx="9070920" cy="3287520"/>
           </a:xfrm>
           <a:prstGeom prst="rect">
             <a:avLst/>
@@ -2495,6 +3065,9 @@
           </a:bodyPr>
           <a:p>
             <a:pPr marL="216000" indent="-216000">
+              <a:lnSpc>
+                <a:spcPct val="100000"/>
+              </a:lnSpc>
               <a:buClr>
                 <a:srgbClr val="000000"/>
               </a:buClr>
@@ -2552,7 +3125,7 @@
       </p:grpSpPr>
       <p:sp>
         <p:nvSpPr>
-          <p:cNvPr id="26" name="PlaceHolder 1"/>
+          <p:cNvPr id="31" name="PlaceHolder 1"/>
           <p:cNvSpPr>
             <a:spLocks noGrp="1"/>
           </p:cNvSpPr>
@@ -2563,7 +3136,7 @@
         <p:spPr>
           <a:xfrm>
             <a:off x="504000" y="226080"/>
-            <a:ext cx="9071280" cy="946080"/>
+            <a:ext cx="9070920" cy="945720"/>
           </a:xfrm>
           <a:prstGeom prst="rect">
             <a:avLst/>
@@ -2583,6 +3156,9 @@
                 <a:spcPct val="100000"/>
               </a:lnSpc>
               <a:buNone/>
+              <a:tabLst>
+                <a:tab algn="l" pos="0"/>
+              </a:tabLst>
             </a:pPr>
             <a:r>
               <a:rPr b="0" lang="en-US" sz="3000" spc="-1" strike="noStrike">
@@ -2604,7 +3180,7 @@
       </p:sp>
       <p:sp>
         <p:nvSpPr>
-          <p:cNvPr id="27" name="PlaceHolder 2"/>
+          <p:cNvPr id="32" name="PlaceHolder 2"/>
           <p:cNvSpPr>
             <a:spLocks noGrp="1"/>
           </p:cNvSpPr>
@@ -2615,7 +3191,7 @@
         <p:spPr>
           <a:xfrm>
             <a:off x="504000" y="1326600"/>
-            <a:ext cx="9071280" cy="3287880"/>
+            <a:ext cx="9070920" cy="3287520"/>
           </a:xfrm>
           <a:prstGeom prst="rect">
             <a:avLst/>
@@ -2631,6 +3207,9 @@
           </a:bodyPr>
           <a:p>
             <a:pPr marL="216000" indent="-216000">
+              <a:lnSpc>
+                <a:spcPct val="100000"/>
+              </a:lnSpc>
               <a:buClr>
                 <a:srgbClr val="000000"/>
               </a:buClr>
@@ -2656,6 +3235,9 @@
           </a:p>
           <a:p>
             <a:pPr marL="216000" indent="-216000">
+              <a:lnSpc>
+                <a:spcPct val="100000"/>
+              </a:lnSpc>
               <a:buClr>
                 <a:srgbClr val="000000"/>
               </a:buClr>
@@ -2713,7 +3295,7 @@
       </p:grpSpPr>
       <p:sp>
         <p:nvSpPr>
-          <p:cNvPr id="28" name="PlaceHolder 1"/>
+          <p:cNvPr id="33" name="PlaceHolder 1"/>
           <p:cNvSpPr>
             <a:spLocks noGrp="1"/>
           </p:cNvSpPr>
@@ -2724,7 +3306,7 @@
         <p:spPr>
           <a:xfrm>
             <a:off x="504000" y="226080"/>
-            <a:ext cx="9071280" cy="946080"/>
+            <a:ext cx="9070920" cy="945720"/>
           </a:xfrm>
           <a:prstGeom prst="rect">
             <a:avLst/>
@@ -2744,6 +3326,9 @@
                 <a:spcPct val="100000"/>
               </a:lnSpc>
               <a:buNone/>
+              <a:tabLst>
+                <a:tab algn="l" pos="0"/>
+              </a:tabLst>
             </a:pPr>
             <a:r>
               <a:rPr b="0" lang="en-US" sz="3000" spc="-1" strike="noStrike">
@@ -2765,7 +3350,7 @@
       </p:sp>
       <p:sp>
         <p:nvSpPr>
-          <p:cNvPr id="29" name="PlaceHolder 2"/>
+          <p:cNvPr id="34" name="PlaceHolder 2"/>
           <p:cNvSpPr>
             <a:spLocks noGrp="1"/>
           </p:cNvSpPr>
@@ -2776,7 +3361,7 @@
         <p:spPr>
           <a:xfrm>
             <a:off x="504000" y="1326600"/>
-            <a:ext cx="9071280" cy="3287880"/>
+            <a:ext cx="9070920" cy="3287520"/>
           </a:xfrm>
           <a:prstGeom prst="rect">
             <a:avLst/>
@@ -2792,6 +3377,9 @@
           </a:bodyPr>
           <a:p>
             <a:pPr marL="216000" indent="-216000">
+              <a:lnSpc>
+                <a:spcPct val="100000"/>
+              </a:lnSpc>
               <a:buClr>
                 <a:srgbClr val="000000"/>
               </a:buClr>
@@ -2849,7 +3437,7 @@
       </p:grpSpPr>
       <p:sp>
         <p:nvSpPr>
-          <p:cNvPr id="30" name="PlaceHolder 1"/>
+          <p:cNvPr id="35" name="PlaceHolder 1"/>
           <p:cNvSpPr>
             <a:spLocks noGrp="1"/>
           </p:cNvSpPr>
@@ -2860,7 +3448,7 @@
         <p:spPr>
           <a:xfrm>
             <a:off x="504000" y="226080"/>
-            <a:ext cx="9071280" cy="4386600"/>
+            <a:ext cx="9070920" cy="4386240"/>
           </a:xfrm>
           <a:prstGeom prst="rect">
             <a:avLst/>
@@ -2875,7 +3463,11 @@
             <a:noAutofit/>
           </a:bodyPr>
           <a:p>
-            <a:pPr algn="ctr"/>
+            <a:pPr algn="ctr">
+              <a:lnSpc>
+                <a:spcPct val="100000"/>
+              </a:lnSpc>
+            </a:pPr>
             <a:r>
               <a:rPr b="0" lang="en-US" sz="3200" spc="-1" strike="noStrike">
                 <a:solidFill>
@@ -3117,4 +3709,110 @@
     </a:fmtScheme>
   </a:themeElements>
 </a:theme>
+</file>
+
+<file path=ppt/theme/theme3.xml><?xml version="1.0" encoding="utf-8"?>
+<a:theme xmlns:a="http://schemas.openxmlformats.org/drawingml/2006/main" xmlns:r="http://schemas.openxmlformats.org/officeDocument/2006/relationships" name="Office">
+  <a:themeElements>
+    <a:clrScheme name="LibreOffice">
+      <a:dk1>
+        <a:srgbClr val="000000"/>
+      </a:dk1>
+      <a:lt1>
+        <a:srgbClr val="ffffff"/>
+      </a:lt1>
+      <a:dk2>
+        <a:srgbClr val="000000"/>
+      </a:dk2>
+      <a:lt2>
+        <a:srgbClr val="ffffff"/>
+      </a:lt2>
+      <a:accent1>
+        <a:srgbClr val="18a303"/>
+      </a:accent1>
+      <a:accent2>
+        <a:srgbClr val="0369a3"/>
+      </a:accent2>
+      <a:accent3>
+        <a:srgbClr val="a33e03"/>
+      </a:accent3>
+      <a:accent4>
+        <a:srgbClr val="8e03a3"/>
+      </a:accent4>
+      <a:accent5>
+        <a:srgbClr val="c99c00"/>
+      </a:accent5>
+      <a:accent6>
+        <a:srgbClr val="c9211e"/>
+      </a:accent6>
+      <a:hlink>
+        <a:srgbClr val="0000ee"/>
+      </a:hlink>
+      <a:folHlink>
+        <a:srgbClr val="551a8b"/>
+      </a:folHlink>
+    </a:clrScheme>
+    <a:fontScheme name="Office">
+      <a:majorFont>
+        <a:latin typeface="Arial" pitchFamily="0" charset="1"/>
+        <a:ea typeface="DejaVu Sans" pitchFamily="0" charset="1"/>
+        <a:cs typeface="DejaVu Sans" pitchFamily="0" charset="1"/>
+      </a:majorFont>
+      <a:minorFont>
+        <a:latin typeface="Arial" pitchFamily="0" charset="1"/>
+        <a:ea typeface="DejaVu Sans" pitchFamily="0" charset="1"/>
+        <a:cs typeface="DejaVu Sans" pitchFamily="0" charset="1"/>
+      </a:minorFont>
+    </a:fontScheme>
+    <a:fmtScheme>
+      <a:fillStyleLst>
+        <a:solidFill>
+          <a:schemeClr val="phClr"/>
+        </a:solidFill>
+        <a:solidFill>
+          <a:schemeClr val="phClr"/>
+        </a:solidFill>
+        <a:solidFill>
+          <a:schemeClr val="phClr"/>
+        </a:solidFill>
+      </a:fillStyleLst>
+      <a:lnStyleLst>
+        <a:ln w="6350" cap="flat" cmpd="sng" algn="ctr">
+          <a:prstDash val="solid"/>
+          <a:miter/>
+        </a:ln>
+        <a:ln w="6350" cap="flat" cmpd="sng" algn="ctr">
+          <a:prstDash val="solid"/>
+          <a:miter/>
+        </a:ln>
+        <a:ln w="6350" cap="flat" cmpd="sng" algn="ctr">
+          <a:prstDash val="solid"/>
+          <a:miter/>
+        </a:ln>
+      </a:lnStyleLst>
+      <a:effectStyleLst>
+        <a:effectStyle>
+          <a:effectLst/>
+        </a:effectStyle>
+        <a:effectStyle>
+          <a:effectLst/>
+        </a:effectStyle>
+        <a:effectStyle>
+          <a:effectLst/>
+        </a:effectStyle>
+      </a:effectStyleLst>
+      <a:bgFillStyleLst>
+        <a:solidFill>
+          <a:schemeClr val="phClr"/>
+        </a:solidFill>
+        <a:solidFill>
+          <a:schemeClr val="phClr"/>
+        </a:solidFill>
+        <a:solidFill>
+          <a:schemeClr val="phClr"/>
+        </a:solidFill>
+      </a:bgFillStyleLst>
+    </a:fmtScheme>
+  </a:themeElements>
+</a:theme>
 </file>
</xml_diff>